<commit_message>
#14 modify AL043 validation document
</commit_message>
<xml_diff>
--- a/function/素材/AL-041～AL-043の図.pptx
+++ b/function/素材/AL-041～AL-043の図.pptx
@@ -205,7 +205,7 @@
             <a:fld id="{B4F30F48-4E14-48AE-9734-2E2BE8ECACDB}" type="datetimeFigureOut">
               <a:rPr kumimoji="1" lang="ja-JP" altLang="en-US" smtClean="0"/>
               <a:pPr/>
-              <a:t>2011/10/28</a:t>
+              <a:t>2015/1/16</a:t>
             </a:fld>
             <a:endParaRPr kumimoji="1" lang="ja-JP" altLang="en-US"/>
           </a:p>
@@ -399,13 +399,18 @@
             <a:fld id="{919777D4-CF65-45C1-8821-8A468166ABBE}" type="slidenum">
               <a:rPr kumimoji="1" lang="ja-JP" altLang="en-US" smtClean="0"/>
               <a:pPr/>
-              <a:t>&lt;#&gt;</a:t>
+              <a:t>‹#›</a:t>
             </a:fld>
             <a:endParaRPr kumimoji="1" lang="ja-JP" altLang="en-US"/>
           </a:p>
         </p:txBody>
       </p:sp>
     </p:spTree>
+    <p:extLst>
+      <p:ext uri="{BB962C8B-B14F-4D97-AF65-F5344CB8AC3E}">
+        <p14:creationId xmlns:p14="http://schemas.microsoft.com/office/powerpoint/2010/main" val="3178368266"/>
+      </p:ext>
+    </p:extLst>
   </p:cSld>
   <p:clrMap bg1="lt1" tx1="dk1" bg2="lt2" tx2="dk2" accent1="accent1" accent2="accent2" accent3="accent3" accent4="accent4" accent5="accent5" accent6="accent6" hlink="hlink" folHlink="folHlink"/>
   <p:notesStyle>
@@ -849,7 +854,7 @@
             <a:fld id="{E90ED720-0104-4369-84BC-D37694168613}" type="datetimeFigureOut">
               <a:rPr kumimoji="1" lang="ja-JP" altLang="en-US" smtClean="0"/>
               <a:pPr/>
-              <a:t>2011/10/28</a:t>
+              <a:t>2015/1/16</a:t>
             </a:fld>
             <a:endParaRPr kumimoji="1" lang="ja-JP" altLang="en-US"/>
           </a:p>
@@ -892,7 +897,7 @@
             <a:fld id="{D2D8002D-B5B0-4BAC-B1F6-782DDCCE6D9C}" type="slidenum">
               <a:rPr kumimoji="1" lang="ja-JP" altLang="en-US" smtClean="0"/>
               <a:pPr/>
-              <a:t>&lt;#&gt;</a:t>
+              <a:t>‹#›</a:t>
             </a:fld>
             <a:endParaRPr kumimoji="1" lang="ja-JP" altLang="en-US"/>
           </a:p>
@@ -1048,7 +1053,7 @@
             <a:fld id="{E90ED720-0104-4369-84BC-D37694168613}" type="datetimeFigureOut">
               <a:rPr kumimoji="1" lang="ja-JP" altLang="en-US" smtClean="0"/>
               <a:pPr/>
-              <a:t>2011/10/28</a:t>
+              <a:t>2015/1/16</a:t>
             </a:fld>
             <a:endParaRPr kumimoji="1" lang="ja-JP" altLang="en-US"/>
           </a:p>
@@ -1091,7 +1096,7 @@
             <a:fld id="{D2D8002D-B5B0-4BAC-B1F6-782DDCCE6D9C}" type="slidenum">
               <a:rPr kumimoji="1" lang="ja-JP" altLang="en-US" smtClean="0"/>
               <a:pPr/>
-              <a:t>&lt;#&gt;</a:t>
+              <a:t>‹#›</a:t>
             </a:fld>
             <a:endParaRPr kumimoji="1" lang="ja-JP" altLang="en-US"/>
           </a:p>
@@ -1257,7 +1262,7 @@
             <a:fld id="{E90ED720-0104-4369-84BC-D37694168613}" type="datetimeFigureOut">
               <a:rPr kumimoji="1" lang="ja-JP" altLang="en-US" smtClean="0"/>
               <a:pPr/>
-              <a:t>2011/10/28</a:t>
+              <a:t>2015/1/16</a:t>
             </a:fld>
             <a:endParaRPr kumimoji="1" lang="ja-JP" altLang="en-US"/>
           </a:p>
@@ -1300,7 +1305,7 @@
             <a:fld id="{D2D8002D-B5B0-4BAC-B1F6-782DDCCE6D9C}" type="slidenum">
               <a:rPr kumimoji="1" lang="ja-JP" altLang="en-US" smtClean="0"/>
               <a:pPr/>
-              <a:t>&lt;#&gt;</a:t>
+              <a:t>‹#›</a:t>
             </a:fld>
             <a:endParaRPr kumimoji="1" lang="ja-JP" altLang="en-US"/>
           </a:p>
@@ -1456,7 +1461,7 @@
             <a:fld id="{E90ED720-0104-4369-84BC-D37694168613}" type="datetimeFigureOut">
               <a:rPr kumimoji="1" lang="ja-JP" altLang="en-US" smtClean="0"/>
               <a:pPr/>
-              <a:t>2011/10/28</a:t>
+              <a:t>2015/1/16</a:t>
             </a:fld>
             <a:endParaRPr kumimoji="1" lang="ja-JP" altLang="en-US"/>
           </a:p>
@@ -1499,7 +1504,7 @@
             <a:fld id="{D2D8002D-B5B0-4BAC-B1F6-782DDCCE6D9C}" type="slidenum">
               <a:rPr kumimoji="1" lang="ja-JP" altLang="en-US" smtClean="0"/>
               <a:pPr/>
-              <a:t>&lt;#&gt;</a:t>
+              <a:t>‹#›</a:t>
             </a:fld>
             <a:endParaRPr kumimoji="1" lang="ja-JP" altLang="en-US"/>
           </a:p>
@@ -1699,7 +1704,7 @@
             <a:fld id="{E90ED720-0104-4369-84BC-D37694168613}" type="datetimeFigureOut">
               <a:rPr kumimoji="1" lang="ja-JP" altLang="en-US" smtClean="0"/>
               <a:pPr/>
-              <a:t>2011/10/28</a:t>
+              <a:t>2015/1/16</a:t>
             </a:fld>
             <a:endParaRPr kumimoji="1" lang="ja-JP" altLang="en-US"/>
           </a:p>
@@ -1742,7 +1747,7 @@
             <a:fld id="{D2D8002D-B5B0-4BAC-B1F6-782DDCCE6D9C}" type="slidenum">
               <a:rPr kumimoji="1" lang="ja-JP" altLang="en-US" smtClean="0"/>
               <a:pPr/>
-              <a:t>&lt;#&gt;</a:t>
+              <a:t>‹#›</a:t>
             </a:fld>
             <a:endParaRPr kumimoji="1" lang="ja-JP" altLang="en-US"/>
           </a:p>
@@ -2048,7 +2053,7 @@
             <a:fld id="{E90ED720-0104-4369-84BC-D37694168613}" type="datetimeFigureOut">
               <a:rPr kumimoji="1" lang="ja-JP" altLang="en-US" smtClean="0"/>
               <a:pPr/>
-              <a:t>2011/10/28</a:t>
+              <a:t>2015/1/16</a:t>
             </a:fld>
             <a:endParaRPr kumimoji="1" lang="ja-JP" altLang="en-US"/>
           </a:p>
@@ -2091,7 +2096,7 @@
             <a:fld id="{D2D8002D-B5B0-4BAC-B1F6-782DDCCE6D9C}" type="slidenum">
               <a:rPr kumimoji="1" lang="ja-JP" altLang="en-US" smtClean="0"/>
               <a:pPr/>
-              <a:t>&lt;#&gt;</a:t>
+              <a:t>‹#›</a:t>
             </a:fld>
             <a:endParaRPr kumimoji="1" lang="ja-JP" altLang="en-US"/>
           </a:p>
@@ -2531,7 +2536,7 @@
             <a:fld id="{E90ED720-0104-4369-84BC-D37694168613}" type="datetimeFigureOut">
               <a:rPr kumimoji="1" lang="ja-JP" altLang="en-US" smtClean="0"/>
               <a:pPr/>
-              <a:t>2011/10/28</a:t>
+              <a:t>2015/1/16</a:t>
             </a:fld>
             <a:endParaRPr kumimoji="1" lang="ja-JP" altLang="en-US"/>
           </a:p>
@@ -2574,7 +2579,7 @@
             <a:fld id="{D2D8002D-B5B0-4BAC-B1F6-782DDCCE6D9C}" type="slidenum">
               <a:rPr kumimoji="1" lang="ja-JP" altLang="en-US" smtClean="0"/>
               <a:pPr/>
-              <a:t>&lt;#&gt;</a:t>
+              <a:t>‹#›</a:t>
             </a:fld>
             <a:endParaRPr kumimoji="1" lang="ja-JP" altLang="en-US"/>
           </a:p>
@@ -2646,7 +2651,7 @@
             <a:fld id="{E90ED720-0104-4369-84BC-D37694168613}" type="datetimeFigureOut">
               <a:rPr kumimoji="1" lang="ja-JP" altLang="en-US" smtClean="0"/>
               <a:pPr/>
-              <a:t>2011/10/28</a:t>
+              <a:t>2015/1/16</a:t>
             </a:fld>
             <a:endParaRPr kumimoji="1" lang="ja-JP" altLang="en-US"/>
           </a:p>
@@ -2689,7 +2694,7 @@
             <a:fld id="{D2D8002D-B5B0-4BAC-B1F6-782DDCCE6D9C}" type="slidenum">
               <a:rPr kumimoji="1" lang="ja-JP" altLang="en-US" smtClean="0"/>
               <a:pPr/>
-              <a:t>&lt;#&gt;</a:t>
+              <a:t>‹#›</a:t>
             </a:fld>
             <a:endParaRPr kumimoji="1" lang="ja-JP" altLang="en-US"/>
           </a:p>
@@ -2738,7 +2743,7 @@
             <a:fld id="{E90ED720-0104-4369-84BC-D37694168613}" type="datetimeFigureOut">
               <a:rPr kumimoji="1" lang="ja-JP" altLang="en-US" smtClean="0"/>
               <a:pPr/>
-              <a:t>2011/10/28</a:t>
+              <a:t>2015/1/16</a:t>
             </a:fld>
             <a:endParaRPr kumimoji="1" lang="ja-JP" altLang="en-US"/>
           </a:p>
@@ -2781,7 +2786,7 @@
             <a:fld id="{D2D8002D-B5B0-4BAC-B1F6-782DDCCE6D9C}" type="slidenum">
               <a:rPr kumimoji="1" lang="ja-JP" altLang="en-US" smtClean="0"/>
               <a:pPr/>
-              <a:t>&lt;#&gt;</a:t>
+              <a:t>‹#›</a:t>
             </a:fld>
             <a:endParaRPr kumimoji="1" lang="ja-JP" altLang="en-US"/>
           </a:p>
@@ -3044,7 +3049,7 @@
             <a:fld id="{E90ED720-0104-4369-84BC-D37694168613}" type="datetimeFigureOut">
               <a:rPr kumimoji="1" lang="ja-JP" altLang="en-US" smtClean="0"/>
               <a:pPr/>
-              <a:t>2011/10/28</a:t>
+              <a:t>2015/1/16</a:t>
             </a:fld>
             <a:endParaRPr kumimoji="1" lang="ja-JP" altLang="en-US"/>
           </a:p>
@@ -3087,7 +3092,7 @@
             <a:fld id="{D2D8002D-B5B0-4BAC-B1F6-782DDCCE6D9C}" type="slidenum">
               <a:rPr kumimoji="1" lang="ja-JP" altLang="en-US" smtClean="0"/>
               <a:pPr/>
-              <a:t>&lt;#&gt;</a:t>
+              <a:t>‹#›</a:t>
             </a:fld>
             <a:endParaRPr kumimoji="1" lang="ja-JP" altLang="en-US"/>
           </a:p>
@@ -3294,7 +3299,7 @@
             <a:fld id="{E90ED720-0104-4369-84BC-D37694168613}" type="datetimeFigureOut">
               <a:rPr kumimoji="1" lang="ja-JP" altLang="en-US" smtClean="0"/>
               <a:pPr/>
-              <a:t>2011/10/28</a:t>
+              <a:t>2015/1/16</a:t>
             </a:fld>
             <a:endParaRPr kumimoji="1" lang="ja-JP" altLang="en-US"/>
           </a:p>
@@ -3337,7 +3342,7 @@
             <a:fld id="{D2D8002D-B5B0-4BAC-B1F6-782DDCCE6D9C}" type="slidenum">
               <a:rPr kumimoji="1" lang="ja-JP" altLang="en-US" smtClean="0"/>
               <a:pPr/>
-              <a:t>&lt;#&gt;</a:t>
+              <a:t>‹#›</a:t>
             </a:fld>
             <a:endParaRPr kumimoji="1" lang="ja-JP" altLang="en-US"/>
           </a:p>
@@ -3536,7 +3541,7 @@
             <a:fld id="{E90ED720-0104-4369-84BC-D37694168613}" type="datetimeFigureOut">
               <a:rPr kumimoji="1" lang="ja-JP" altLang="en-US" smtClean="0"/>
               <a:pPr/>
-              <a:t>2011/10/28</a:t>
+              <a:t>2015/1/16</a:t>
             </a:fld>
             <a:endParaRPr kumimoji="1" lang="ja-JP" altLang="en-US"/>
           </a:p>
@@ -3615,7 +3620,7 @@
             <a:fld id="{D2D8002D-B5B0-4BAC-B1F6-782DDCCE6D9C}" type="slidenum">
               <a:rPr kumimoji="1" lang="ja-JP" altLang="en-US" smtClean="0"/>
               <a:pPr/>
-              <a:t>&lt;#&gt;</a:t>
+              <a:t>‹#›</a:t>
             </a:fld>
             <a:endParaRPr kumimoji="1" lang="ja-JP" altLang="en-US"/>
           </a:p>
@@ -10122,47 +10127,6 @@
       </p:sp>
       <p:sp>
         <p:nvSpPr>
-          <p:cNvPr id="32" name="テキスト ボックス 31"/>
-          <p:cNvSpPr txBox="1"/>
-          <p:nvPr/>
-        </p:nvSpPr>
-        <p:spPr>
-          <a:xfrm>
-            <a:off x="4629901" y="2108865"/>
-            <a:ext cx="1565942" cy="276999"/>
-          </a:xfrm>
-          <a:prstGeom prst="rect">
-            <a:avLst/>
-          </a:prstGeom>
-          <a:solidFill>
-            <a:schemeClr val="accent3">
-              <a:lumMod val="40000"/>
-              <a:lumOff val="60000"/>
-            </a:schemeClr>
-          </a:solidFill>
-          <a:ln w="15875" cmpd="sng">
-            <a:solidFill>
-              <a:schemeClr val="tx1"/>
-            </a:solidFill>
-            <a:prstDash val="dash"/>
-          </a:ln>
-        </p:spPr>
-        <p:txBody>
-          <a:bodyPr wrap="none" rtlCol="0">
-            <a:spAutoFit/>
-          </a:bodyPr>
-          <a:lstStyle/>
-          <a:p>
-            <a:r>
-              <a:rPr lang="en-US" altLang="ja-JP" sz="1200" dirty="0" err="1" smtClean="0"/>
-              <a:t>QueryRowHandleDAO</a:t>
-            </a:r>
-            <a:endParaRPr lang="ja-JP" altLang="en-US" sz="1200" dirty="0"/>
-          </a:p>
-        </p:txBody>
-      </p:sp>
-      <p:sp>
-        <p:nvSpPr>
           <p:cNvPr id="39" name="フローチャート : 磁気ディスク 38"/>
           <p:cNvSpPr/>
           <p:nvPr/>
@@ -10230,7 +10194,7 @@
         <p:spPr>
           <a:xfrm>
             <a:off x="2928216" y="2180690"/>
-            <a:ext cx="1701685" cy="1588"/>
+            <a:ext cx="1441378" cy="0"/>
           </a:xfrm>
           <a:prstGeom prst="straightConnector1">
             <a:avLst/>
@@ -10340,7 +10304,7 @@
         <p:spPr>
           <a:xfrm>
             <a:off x="4187999" y="5505182"/>
-            <a:ext cx="3932487" cy="261610"/>
+            <a:ext cx="3094117" cy="261610"/>
           </a:xfrm>
           <a:prstGeom prst="rect">
             <a:avLst/>
@@ -10357,7 +10321,7 @@
               <a:t>：</a:t>
             </a:r>
             <a:r>
-              <a:rPr lang="en-US" altLang="ja-JP" sz="1100" dirty="0" err="1" smtClean="0"/>
+              <a:rPr lang="en-US" altLang="ja-JP" sz="1100" dirty="0" smtClean="0"/>
               <a:t>validator</a:t>
             </a:r>
             <a:r>
@@ -10366,19 +10330,11 @@
             </a:r>
             <a:r>
               <a:rPr lang="en-US" altLang="ja-JP" sz="1100" dirty="0" smtClean="0"/>
-              <a:t>(</a:t>
+              <a:t>(Spring</a:t>
             </a:r>
             <a:r>
               <a:rPr lang="ja-JP" altLang="en-US" sz="1100" dirty="0" smtClean="0"/>
-              <a:t>通常は</a:t>
-            </a:r>
-            <a:r>
-              <a:rPr lang="en-US" altLang="ja-JP" sz="1100" dirty="0" err="1" smtClean="0"/>
-              <a:t>BeanValidator</a:t>
-            </a:r>
-            <a:r>
-              <a:rPr lang="ja-JP" altLang="en-US" sz="1100" dirty="0" smtClean="0"/>
-              <a:t>を利用</a:t>
+              <a:t>が提供</a:t>
             </a:r>
             <a:r>
               <a:rPr lang="en-US" altLang="ja-JP" sz="1100" dirty="0" smtClean="0"/>
@@ -10396,7 +10352,7 @@
         </p:nvSpPr>
         <p:spPr>
           <a:xfrm>
-            <a:off x="3539927" y="4804266"/>
+            <a:off x="3539927" y="4829706"/>
             <a:ext cx="4613474" cy="1053610"/>
           </a:xfrm>
           <a:prstGeom prst="rect">
@@ -10455,44 +10411,6 @@
       </p:sp>
       <p:sp>
         <p:nvSpPr>
-          <p:cNvPr id="69" name="テキスト ボックス 68"/>
-          <p:cNvSpPr txBox="1"/>
-          <p:nvPr/>
-        </p:nvSpPr>
-        <p:spPr>
-          <a:xfrm>
-            <a:off x="3683943" y="5277163"/>
-            <a:ext cx="504000" cy="180000"/>
-          </a:xfrm>
-          <a:prstGeom prst="rect">
-            <a:avLst/>
-          </a:prstGeom>
-          <a:solidFill>
-            <a:schemeClr val="accent3">
-              <a:lumMod val="60000"/>
-              <a:lumOff val="40000"/>
-            </a:schemeClr>
-          </a:solidFill>
-          <a:ln w="15875" cmpd="sng">
-            <a:solidFill>
-              <a:schemeClr val="tx1"/>
-            </a:solidFill>
-            <a:prstDash val="dash"/>
-          </a:ln>
-        </p:spPr>
-        <p:txBody>
-          <a:bodyPr wrap="none" rtlCol="0" anchor="ctr">
-            <a:noAutofit/>
-          </a:bodyPr>
-          <a:lstStyle/>
-          <a:p>
-            <a:pPr algn="ctr"/>
-            <a:endParaRPr lang="ja-JP" altLang="en-US" sz="1100" dirty="0" smtClean="0"/>
-          </a:p>
-        </p:txBody>
-      </p:sp>
-      <p:sp>
-        <p:nvSpPr>
           <p:cNvPr id="70" name="正方形/長方形 69"/>
           <p:cNvSpPr/>
           <p:nvPr/>
@@ -10517,20 +10435,12 @@
               <a:t>：</a:t>
             </a:r>
             <a:r>
-              <a:rPr lang="en-US" altLang="ja-JP" sz="1100" dirty="0" smtClean="0"/>
-              <a:t>TERASOLUNA</a:t>
+              <a:rPr lang="ja-JP" altLang="en-US" sz="1100" dirty="0"/>
+              <a:t>手動</a:t>
             </a:r>
             <a:r>
               <a:rPr lang="ja-JP" altLang="en-US" sz="1100" dirty="0" smtClean="0"/>
-              <a:t>　</a:t>
-            </a:r>
-            <a:r>
-              <a:rPr lang="en-US" altLang="ja-JP" sz="1100" dirty="0" smtClean="0"/>
-              <a:t>Batch Framework for Java</a:t>
-            </a:r>
-            <a:r>
-              <a:rPr lang="ja-JP" altLang="en-US" sz="1100" dirty="0" smtClean="0"/>
-              <a:t>が提供</a:t>
+              <a:t>で実装</a:t>
             </a:r>
             <a:endParaRPr lang="ja-JP" altLang="en-US" sz="1100" dirty="0"/>
           </a:p>
@@ -11123,15 +11033,14 @@
         <p:nvCxnSpPr>
           <p:cNvPr id="52" name="図形 51"/>
           <p:cNvCxnSpPr>
-            <a:stCxn id="32" idx="2"/>
             <a:endCxn id="41" idx="0"/>
           </p:cNvCxnSpPr>
           <p:nvPr/>
         </p:nvCxnSpPr>
         <p:spPr>
-          <a:xfrm rot="5400000">
-            <a:off x="5087951" y="2710785"/>
-            <a:ext cx="649843" cy="1588"/>
+          <a:xfrm rot="16200000" flipH="1">
+            <a:off x="5086450" y="2709284"/>
+            <a:ext cx="649843" cy="3002"/>
           </a:xfrm>
           <a:prstGeom prst="bentConnector3">
             <a:avLst>
@@ -11205,14 +11114,13 @@
           <p:cNvPr id="56" name="直線矢印コネクタ 55"/>
           <p:cNvCxnSpPr>
             <a:stCxn id="39" idx="2"/>
-            <a:endCxn id="32" idx="3"/>
           </p:cNvCxnSpPr>
           <p:nvPr/>
         </p:nvCxnSpPr>
         <p:spPr>
-          <a:xfrm rot="10800000">
-            <a:off x="6195843" y="2247365"/>
-            <a:ext cx="890758" cy="1588"/>
+          <a:xfrm flipH="1">
+            <a:off x="6443839" y="2247365"/>
+            <a:ext cx="642762" cy="0"/>
           </a:xfrm>
           <a:prstGeom prst="straightConnector1">
             <a:avLst/>
@@ -12117,6 +12025,100 @@
           </p:txBody>
         </p:sp>
       </p:grpSp>
+      <p:sp>
+        <p:nvSpPr>
+          <p:cNvPr id="46" name="テキスト ボックス 45"/>
+          <p:cNvSpPr txBox="1"/>
+          <p:nvPr/>
+        </p:nvSpPr>
+        <p:spPr>
+          <a:xfrm>
+            <a:off x="3686004" y="5267325"/>
+            <a:ext cx="504000" cy="180000"/>
+          </a:xfrm>
+          <a:prstGeom prst="roundRect">
+            <a:avLst/>
+          </a:prstGeom>
+          <a:solidFill>
+            <a:schemeClr val="accent2">
+              <a:lumMod val="40000"/>
+              <a:lumOff val="60000"/>
+            </a:schemeClr>
+          </a:solidFill>
+          <a:ln w="22225">
+            <a:solidFill>
+              <a:schemeClr val="tx1"/>
+            </a:solidFill>
+          </a:ln>
+        </p:spPr>
+        <p:txBody>
+          <a:bodyPr wrap="none" rtlCol="0" anchor="ctr">
+            <a:noAutofit/>
+          </a:bodyPr>
+          <a:lstStyle/>
+          <a:p>
+            <a:pPr algn="ctr"/>
+            <a:endParaRPr kumimoji="1" lang="ja-JP" altLang="en-US" sz="1100" dirty="0" smtClean="0"/>
+          </a:p>
+        </p:txBody>
+      </p:sp>
+      <p:sp>
+        <p:nvSpPr>
+          <p:cNvPr id="48" name="テキスト ボックス 47"/>
+          <p:cNvSpPr txBox="1"/>
+          <p:nvPr/>
+        </p:nvSpPr>
+        <p:spPr>
+          <a:xfrm>
+            <a:off x="4376025" y="2103515"/>
+            <a:ext cx="2067814" cy="245986"/>
+          </a:xfrm>
+          <a:prstGeom prst="roundRect">
+            <a:avLst/>
+          </a:prstGeom>
+          <a:solidFill>
+            <a:schemeClr val="accent2">
+              <a:lumMod val="40000"/>
+              <a:lumOff val="60000"/>
+            </a:schemeClr>
+          </a:solidFill>
+          <a:ln w="22225">
+            <a:solidFill>
+              <a:schemeClr val="tx1"/>
+            </a:solidFill>
+          </a:ln>
+        </p:spPr>
+        <p:txBody>
+          <a:bodyPr wrap="none" rtlCol="0" anchor="ctr">
+            <a:noAutofit/>
+          </a:bodyPr>
+          <a:lstStyle/>
+          <a:p>
+            <a:pPr algn="ctr"/>
+            <a:r>
+              <a:rPr kumimoji="1" lang="en-US" altLang="ja-JP" sz="1100" dirty="0" err="1" smtClean="0">
+                <a:latin typeface="+mn-ea"/>
+              </a:rPr>
+              <a:t>ResultHandler</a:t>
+            </a:r>
+            <a:r>
+              <a:rPr lang="ja-JP" altLang="en-US" sz="1100" dirty="0" smtClean="0">
+                <a:latin typeface="+mn-ea"/>
+              </a:rPr>
+              <a:t>を利用する</a:t>
+            </a:r>
+            <a:r>
+              <a:rPr lang="en-US" altLang="ja-JP" sz="1100" dirty="0" smtClean="0">
+                <a:latin typeface="+mn-ea"/>
+              </a:rPr>
+              <a:t>DAO</a:t>
+            </a:r>
+            <a:endParaRPr kumimoji="1" lang="ja-JP" altLang="en-US" sz="1100" dirty="0" smtClean="0">
+              <a:latin typeface="+mn-ea"/>
+            </a:endParaRPr>
+          </a:p>
+        </p:txBody>
+      </p:sp>
     </p:spTree>
   </p:cSld>
   <p:clrMapOvr>

</xml_diff>

<commit_message>
#14 modify taromarun comments and before change structure
</commit_message>
<xml_diff>
--- a/function/素材/AL-041～AL-043の図.pptx
+++ b/function/素材/AL-041～AL-043の図.pptx
@@ -205,7 +205,7 @@
             <a:fld id="{B4F30F48-4E14-48AE-9734-2E2BE8ECACDB}" type="datetimeFigureOut">
               <a:rPr kumimoji="1" lang="ja-JP" altLang="en-US" smtClean="0"/>
               <a:pPr/>
-              <a:t>2015/1/16</a:t>
+              <a:t>2015/1/30</a:t>
             </a:fld>
             <a:endParaRPr kumimoji="1" lang="ja-JP" altLang="en-US"/>
           </a:p>
@@ -854,7 +854,7 @@
             <a:fld id="{E90ED720-0104-4369-84BC-D37694168613}" type="datetimeFigureOut">
               <a:rPr kumimoji="1" lang="ja-JP" altLang="en-US" smtClean="0"/>
               <a:pPr/>
-              <a:t>2015/1/16</a:t>
+              <a:t>2015/1/30</a:t>
             </a:fld>
             <a:endParaRPr kumimoji="1" lang="ja-JP" altLang="en-US"/>
           </a:p>
@@ -1053,7 +1053,7 @@
             <a:fld id="{E90ED720-0104-4369-84BC-D37694168613}" type="datetimeFigureOut">
               <a:rPr kumimoji="1" lang="ja-JP" altLang="en-US" smtClean="0"/>
               <a:pPr/>
-              <a:t>2015/1/16</a:t>
+              <a:t>2015/1/30</a:t>
             </a:fld>
             <a:endParaRPr kumimoji="1" lang="ja-JP" altLang="en-US"/>
           </a:p>
@@ -1262,7 +1262,7 @@
             <a:fld id="{E90ED720-0104-4369-84BC-D37694168613}" type="datetimeFigureOut">
               <a:rPr kumimoji="1" lang="ja-JP" altLang="en-US" smtClean="0"/>
               <a:pPr/>
-              <a:t>2015/1/16</a:t>
+              <a:t>2015/1/30</a:t>
             </a:fld>
             <a:endParaRPr kumimoji="1" lang="ja-JP" altLang="en-US"/>
           </a:p>
@@ -1461,7 +1461,7 @@
             <a:fld id="{E90ED720-0104-4369-84BC-D37694168613}" type="datetimeFigureOut">
               <a:rPr kumimoji="1" lang="ja-JP" altLang="en-US" smtClean="0"/>
               <a:pPr/>
-              <a:t>2015/1/16</a:t>
+              <a:t>2015/1/30</a:t>
             </a:fld>
             <a:endParaRPr kumimoji="1" lang="ja-JP" altLang="en-US"/>
           </a:p>
@@ -1704,7 +1704,7 @@
             <a:fld id="{E90ED720-0104-4369-84BC-D37694168613}" type="datetimeFigureOut">
               <a:rPr kumimoji="1" lang="ja-JP" altLang="en-US" smtClean="0"/>
               <a:pPr/>
-              <a:t>2015/1/16</a:t>
+              <a:t>2015/1/30</a:t>
             </a:fld>
             <a:endParaRPr kumimoji="1" lang="ja-JP" altLang="en-US"/>
           </a:p>
@@ -2053,7 +2053,7 @@
             <a:fld id="{E90ED720-0104-4369-84BC-D37694168613}" type="datetimeFigureOut">
               <a:rPr kumimoji="1" lang="ja-JP" altLang="en-US" smtClean="0"/>
               <a:pPr/>
-              <a:t>2015/1/16</a:t>
+              <a:t>2015/1/30</a:t>
             </a:fld>
             <a:endParaRPr kumimoji="1" lang="ja-JP" altLang="en-US"/>
           </a:p>
@@ -2536,7 +2536,7 @@
             <a:fld id="{E90ED720-0104-4369-84BC-D37694168613}" type="datetimeFigureOut">
               <a:rPr kumimoji="1" lang="ja-JP" altLang="en-US" smtClean="0"/>
               <a:pPr/>
-              <a:t>2015/1/16</a:t>
+              <a:t>2015/1/30</a:t>
             </a:fld>
             <a:endParaRPr kumimoji="1" lang="ja-JP" altLang="en-US"/>
           </a:p>
@@ -2651,7 +2651,7 @@
             <a:fld id="{E90ED720-0104-4369-84BC-D37694168613}" type="datetimeFigureOut">
               <a:rPr kumimoji="1" lang="ja-JP" altLang="en-US" smtClean="0"/>
               <a:pPr/>
-              <a:t>2015/1/16</a:t>
+              <a:t>2015/1/30</a:t>
             </a:fld>
             <a:endParaRPr kumimoji="1" lang="ja-JP" altLang="en-US"/>
           </a:p>
@@ -2743,7 +2743,7 @@
             <a:fld id="{E90ED720-0104-4369-84BC-D37694168613}" type="datetimeFigureOut">
               <a:rPr kumimoji="1" lang="ja-JP" altLang="en-US" smtClean="0"/>
               <a:pPr/>
-              <a:t>2015/1/16</a:t>
+              <a:t>2015/1/30</a:t>
             </a:fld>
             <a:endParaRPr kumimoji="1" lang="ja-JP" altLang="en-US"/>
           </a:p>
@@ -3049,7 +3049,7 @@
             <a:fld id="{E90ED720-0104-4369-84BC-D37694168613}" type="datetimeFigureOut">
               <a:rPr kumimoji="1" lang="ja-JP" altLang="en-US" smtClean="0"/>
               <a:pPr/>
-              <a:t>2015/1/16</a:t>
+              <a:t>2015/1/30</a:t>
             </a:fld>
             <a:endParaRPr kumimoji="1" lang="ja-JP" altLang="en-US"/>
           </a:p>
@@ -3299,7 +3299,7 @@
             <a:fld id="{E90ED720-0104-4369-84BC-D37694168613}" type="datetimeFigureOut">
               <a:rPr kumimoji="1" lang="ja-JP" altLang="en-US" smtClean="0"/>
               <a:pPr/>
-              <a:t>2015/1/16</a:t>
+              <a:t>2015/1/30</a:t>
             </a:fld>
             <a:endParaRPr kumimoji="1" lang="ja-JP" altLang="en-US"/>
           </a:p>
@@ -3541,7 +3541,7 @@
             <a:fld id="{E90ED720-0104-4369-84BC-D37694168613}" type="datetimeFigureOut">
               <a:rPr kumimoji="1" lang="ja-JP" altLang="en-US" smtClean="0"/>
               <a:pPr/>
-              <a:t>2015/1/16</a:t>
+              <a:t>2015/1/30</a:t>
             </a:fld>
             <a:endParaRPr kumimoji="1" lang="ja-JP" altLang="en-US"/>
           </a:p>
@@ -10432,11 +10432,7 @@
           <a:p>
             <a:r>
               <a:rPr lang="ja-JP" altLang="en-US" sz="1100" dirty="0" smtClean="0"/>
-              <a:t>：</a:t>
-            </a:r>
-            <a:r>
-              <a:rPr lang="ja-JP" altLang="en-US" sz="1100" dirty="0"/>
-              <a:t>手動</a:t>
+              <a:t>：インタフェースのみ手動</a:t>
             </a:r>
             <a:r>
               <a:rPr lang="ja-JP" altLang="en-US" sz="1100" dirty="0" smtClean="0"/>

</xml_diff>